<commit_message>
fixed errors in top and hbottom and image
</commit_message>
<xml_diff>
--- a/pictures/DroneConfigs.pptx
+++ b/pictures/DroneConfigs.pptx
@@ -288,7 +288,7 @@
           <a:p>
             <a:fld id="{E03162C6-0571-EE4A-B6AC-459411ED4CBB}" type="datetimeFigureOut">
               <a:rPr lang="en-US" smtClean="0"/>
-              <a:t>2/24/16</a:t>
+              <a:t>3/1/16</a:t>
             </a:fld>
             <a:endParaRPr lang="en-US"/>
           </a:p>
@@ -458,7 +458,7 @@
           <a:p>
             <a:fld id="{E03162C6-0571-EE4A-B6AC-459411ED4CBB}" type="datetimeFigureOut">
               <a:rPr lang="en-US" smtClean="0"/>
-              <a:t>2/24/16</a:t>
+              <a:t>3/1/16</a:t>
             </a:fld>
             <a:endParaRPr lang="en-US"/>
           </a:p>
@@ -638,7 +638,7 @@
           <a:p>
             <a:fld id="{E03162C6-0571-EE4A-B6AC-459411ED4CBB}" type="datetimeFigureOut">
               <a:rPr lang="en-US" smtClean="0"/>
-              <a:t>2/24/16</a:t>
+              <a:t>3/1/16</a:t>
             </a:fld>
             <a:endParaRPr lang="en-US"/>
           </a:p>
@@ -808,7 +808,7 @@
           <a:p>
             <a:fld id="{E03162C6-0571-EE4A-B6AC-459411ED4CBB}" type="datetimeFigureOut">
               <a:rPr lang="en-US" smtClean="0"/>
-              <a:t>2/24/16</a:t>
+              <a:t>3/1/16</a:t>
             </a:fld>
             <a:endParaRPr lang="en-US"/>
           </a:p>
@@ -1054,7 +1054,7 @@
           <a:p>
             <a:fld id="{E03162C6-0571-EE4A-B6AC-459411ED4CBB}" type="datetimeFigureOut">
               <a:rPr lang="en-US" smtClean="0"/>
-              <a:t>2/24/16</a:t>
+              <a:t>3/1/16</a:t>
             </a:fld>
             <a:endParaRPr lang="en-US"/>
           </a:p>
@@ -1342,7 +1342,7 @@
           <a:p>
             <a:fld id="{E03162C6-0571-EE4A-B6AC-459411ED4CBB}" type="datetimeFigureOut">
               <a:rPr lang="en-US" smtClean="0"/>
-              <a:t>2/24/16</a:t>
+              <a:t>3/1/16</a:t>
             </a:fld>
             <a:endParaRPr lang="en-US"/>
           </a:p>
@@ -1764,7 +1764,7 @@
           <a:p>
             <a:fld id="{E03162C6-0571-EE4A-B6AC-459411ED4CBB}" type="datetimeFigureOut">
               <a:rPr lang="en-US" smtClean="0"/>
-              <a:t>2/24/16</a:t>
+              <a:t>3/1/16</a:t>
             </a:fld>
             <a:endParaRPr lang="en-US"/>
           </a:p>
@@ -1882,7 +1882,7 @@
           <a:p>
             <a:fld id="{E03162C6-0571-EE4A-B6AC-459411ED4CBB}" type="datetimeFigureOut">
               <a:rPr lang="en-US" smtClean="0"/>
-              <a:t>2/24/16</a:t>
+              <a:t>3/1/16</a:t>
             </a:fld>
             <a:endParaRPr lang="en-US"/>
           </a:p>
@@ -1977,7 +1977,7 @@
           <a:p>
             <a:fld id="{E03162C6-0571-EE4A-B6AC-459411ED4CBB}" type="datetimeFigureOut">
               <a:rPr lang="en-US" smtClean="0"/>
-              <a:t>2/24/16</a:t>
+              <a:t>3/1/16</a:t>
             </a:fld>
             <a:endParaRPr lang="en-US"/>
           </a:p>
@@ -2254,7 +2254,7 @@
           <a:p>
             <a:fld id="{E03162C6-0571-EE4A-B6AC-459411ED4CBB}" type="datetimeFigureOut">
               <a:rPr lang="en-US" smtClean="0"/>
-              <a:t>2/24/16</a:t>
+              <a:t>3/1/16</a:t>
             </a:fld>
             <a:endParaRPr lang="en-US"/>
           </a:p>
@@ -2507,7 +2507,7 @@
           <a:p>
             <a:fld id="{E03162C6-0571-EE4A-B6AC-459411ED4CBB}" type="datetimeFigureOut">
               <a:rPr lang="en-US" smtClean="0"/>
-              <a:t>2/24/16</a:t>
+              <a:t>3/1/16</a:t>
             </a:fld>
             <a:endParaRPr lang="en-US"/>
           </a:p>
@@ -2720,7 +2720,7 @@
           <a:p>
             <a:fld id="{E03162C6-0571-EE4A-B6AC-459411ED4CBB}" type="datetimeFigureOut">
               <a:rPr lang="en-US" smtClean="0"/>
-              <a:t>2/24/16</a:t>
+              <a:t>3/1/16</a:t>
             </a:fld>
             <a:endParaRPr lang="en-US"/>
           </a:p>
@@ -3095,6 +3095,146 @@
           <a:chExt cx="0" cy="0"/>
         </a:xfrm>
       </p:grpSpPr>
+      <p:sp>
+        <p:nvSpPr>
+          <p:cNvPr id="69" name="Freeform 68"/>
+          <p:cNvSpPr/>
+          <p:nvPr/>
+        </p:nvSpPr>
+        <p:spPr>
+          <a:xfrm>
+            <a:off x="2194560" y="2468880"/>
+            <a:ext cx="5913120" cy="2783840"/>
+          </a:xfrm>
+          <a:custGeom>
+            <a:avLst/>
+            <a:gdLst>
+              <a:gd name="connsiteX0" fmla="*/ 5902960 w 5913120"/>
+              <a:gd name="connsiteY0" fmla="*/ 0 h 2783840"/>
+              <a:gd name="connsiteX1" fmla="*/ 2651760 w 5913120"/>
+              <a:gd name="connsiteY1" fmla="*/ 10160 h 2783840"/>
+              <a:gd name="connsiteX2" fmla="*/ 0 w 5913120"/>
+              <a:gd name="connsiteY2" fmla="*/ 1381760 h 2783840"/>
+              <a:gd name="connsiteX3" fmla="*/ 2286000 w 5913120"/>
+              <a:gd name="connsiteY3" fmla="*/ 2783840 h 2783840"/>
+              <a:gd name="connsiteX4" fmla="*/ 2682240 w 5913120"/>
+              <a:gd name="connsiteY4" fmla="*/ 2600960 h 2783840"/>
+              <a:gd name="connsiteX5" fmla="*/ 5913120 w 5913120"/>
+              <a:gd name="connsiteY5" fmla="*/ 2600960 h 2783840"/>
+              <a:gd name="connsiteX6" fmla="*/ 5902960 w 5913120"/>
+              <a:gd name="connsiteY6" fmla="*/ 0 h 2783840"/>
+            </a:gdLst>
+            <a:ahLst/>
+            <a:cxnLst>
+              <a:cxn ang="0">
+                <a:pos x="connsiteX0" y="connsiteY0"/>
+              </a:cxn>
+              <a:cxn ang="0">
+                <a:pos x="connsiteX1" y="connsiteY1"/>
+              </a:cxn>
+              <a:cxn ang="0">
+                <a:pos x="connsiteX2" y="connsiteY2"/>
+              </a:cxn>
+              <a:cxn ang="0">
+                <a:pos x="connsiteX3" y="connsiteY3"/>
+              </a:cxn>
+              <a:cxn ang="0">
+                <a:pos x="connsiteX4" y="connsiteY4"/>
+              </a:cxn>
+              <a:cxn ang="0">
+                <a:pos x="connsiteX5" y="connsiteY5"/>
+              </a:cxn>
+              <a:cxn ang="0">
+                <a:pos x="connsiteX6" y="connsiteY6"/>
+              </a:cxn>
+            </a:cxnLst>
+            <a:rect l="l" t="t" r="r" b="b"/>
+            <a:pathLst>
+              <a:path w="5913120" h="2783840">
+                <a:moveTo>
+                  <a:pt x="5902960" y="0"/>
+                </a:moveTo>
+                <a:lnTo>
+                  <a:pt x="2651760" y="10160"/>
+                </a:lnTo>
+                <a:lnTo>
+                  <a:pt x="0" y="1381760"/>
+                </a:lnTo>
+                <a:lnTo>
+                  <a:pt x="2286000" y="2783840"/>
+                </a:lnTo>
+                <a:lnTo>
+                  <a:pt x="2682240" y="2600960"/>
+                </a:lnTo>
+                <a:lnTo>
+                  <a:pt x="5913120" y="2600960"/>
+                </a:lnTo>
+                <a:cubicBezTo>
+                  <a:pt x="5909733" y="1730587"/>
+                  <a:pt x="5906347" y="860213"/>
+                  <a:pt x="5902960" y="0"/>
+                </a:cubicBezTo>
+                <a:close/>
+              </a:path>
+            </a:pathLst>
+          </a:custGeom>
+        </p:spPr>
+        <p:style>
+          <a:lnRef idx="1">
+            <a:schemeClr val="accent6"/>
+          </a:lnRef>
+          <a:fillRef idx="2">
+            <a:schemeClr val="accent6"/>
+          </a:fillRef>
+          <a:effectRef idx="1">
+            <a:schemeClr val="accent6"/>
+          </a:effectRef>
+          <a:fontRef idx="minor">
+            <a:schemeClr val="dk1"/>
+          </a:fontRef>
+        </p:style>
+        <p:txBody>
+          <a:bodyPr rtlCol="0" anchor="ctr"/>
+          <a:lstStyle/>
+          <a:p>
+            <a:pPr algn="ctr"/>
+            <a:endParaRPr lang="en-US" dirty="0"/>
+          </a:p>
+        </p:txBody>
+      </p:sp>
+      <p:cxnSp>
+        <p:nvCxnSpPr>
+          <p:cNvPr id="23" name="Straight Connector 22"/>
+          <p:cNvCxnSpPr>
+            <a:endCxn id="5" idx="0"/>
+          </p:cNvCxnSpPr>
+          <p:nvPr/>
+        </p:nvCxnSpPr>
+        <p:spPr>
+          <a:xfrm flipH="1">
+            <a:off x="3323087" y="4200071"/>
+            <a:ext cx="196628" cy="351264"/>
+          </a:xfrm>
+          <a:prstGeom prst="line">
+            <a:avLst/>
+          </a:prstGeom>
+          <a:effectLst/>
+        </p:spPr>
+        <p:style>
+          <a:lnRef idx="2">
+            <a:schemeClr val="accent1"/>
+          </a:lnRef>
+          <a:fillRef idx="0">
+            <a:schemeClr val="accent1"/>
+          </a:fillRef>
+          <a:effectRef idx="1">
+            <a:schemeClr val="accent1"/>
+          </a:effectRef>
+          <a:fontRef idx="minor">
+            <a:schemeClr val="tx1"/>
+          </a:fontRef>
+        </p:style>
+      </p:cxnSp>
       <p:grpSp>
         <p:nvGrpSpPr>
           <p:cNvPr id="3" name="Group 2"/>
@@ -3338,113 +3478,6 @@
           </p:txBody>
         </p:sp>
       </p:grpSp>
-      <p:sp>
-        <p:nvSpPr>
-          <p:cNvPr id="69" name="Freeform 68"/>
-          <p:cNvSpPr/>
-          <p:nvPr/>
-        </p:nvSpPr>
-        <p:spPr>
-          <a:xfrm>
-            <a:off x="2194560" y="2468880"/>
-            <a:ext cx="5913120" cy="2783840"/>
-          </a:xfrm>
-          <a:custGeom>
-            <a:avLst/>
-            <a:gdLst>
-              <a:gd name="connsiteX0" fmla="*/ 5902960 w 5913120"/>
-              <a:gd name="connsiteY0" fmla="*/ 0 h 2783840"/>
-              <a:gd name="connsiteX1" fmla="*/ 2651760 w 5913120"/>
-              <a:gd name="connsiteY1" fmla="*/ 10160 h 2783840"/>
-              <a:gd name="connsiteX2" fmla="*/ 0 w 5913120"/>
-              <a:gd name="connsiteY2" fmla="*/ 1381760 h 2783840"/>
-              <a:gd name="connsiteX3" fmla="*/ 2286000 w 5913120"/>
-              <a:gd name="connsiteY3" fmla="*/ 2783840 h 2783840"/>
-              <a:gd name="connsiteX4" fmla="*/ 2682240 w 5913120"/>
-              <a:gd name="connsiteY4" fmla="*/ 2600960 h 2783840"/>
-              <a:gd name="connsiteX5" fmla="*/ 5913120 w 5913120"/>
-              <a:gd name="connsiteY5" fmla="*/ 2600960 h 2783840"/>
-              <a:gd name="connsiteX6" fmla="*/ 5902960 w 5913120"/>
-              <a:gd name="connsiteY6" fmla="*/ 0 h 2783840"/>
-            </a:gdLst>
-            <a:ahLst/>
-            <a:cxnLst>
-              <a:cxn ang="0">
-                <a:pos x="connsiteX0" y="connsiteY0"/>
-              </a:cxn>
-              <a:cxn ang="0">
-                <a:pos x="connsiteX1" y="connsiteY1"/>
-              </a:cxn>
-              <a:cxn ang="0">
-                <a:pos x="connsiteX2" y="connsiteY2"/>
-              </a:cxn>
-              <a:cxn ang="0">
-                <a:pos x="connsiteX3" y="connsiteY3"/>
-              </a:cxn>
-              <a:cxn ang="0">
-                <a:pos x="connsiteX4" y="connsiteY4"/>
-              </a:cxn>
-              <a:cxn ang="0">
-                <a:pos x="connsiteX5" y="connsiteY5"/>
-              </a:cxn>
-              <a:cxn ang="0">
-                <a:pos x="connsiteX6" y="connsiteY6"/>
-              </a:cxn>
-            </a:cxnLst>
-            <a:rect l="l" t="t" r="r" b="b"/>
-            <a:pathLst>
-              <a:path w="5913120" h="2783840">
-                <a:moveTo>
-                  <a:pt x="5902960" y="0"/>
-                </a:moveTo>
-                <a:lnTo>
-                  <a:pt x="2651760" y="10160"/>
-                </a:lnTo>
-                <a:lnTo>
-                  <a:pt x="0" y="1381760"/>
-                </a:lnTo>
-                <a:lnTo>
-                  <a:pt x="2286000" y="2783840"/>
-                </a:lnTo>
-                <a:lnTo>
-                  <a:pt x="2682240" y="2600960"/>
-                </a:lnTo>
-                <a:lnTo>
-                  <a:pt x="5913120" y="2600960"/>
-                </a:lnTo>
-                <a:cubicBezTo>
-                  <a:pt x="5909733" y="1730587"/>
-                  <a:pt x="5906347" y="860213"/>
-                  <a:pt x="5902960" y="0"/>
-                </a:cubicBezTo>
-                <a:close/>
-              </a:path>
-            </a:pathLst>
-          </a:custGeom>
-        </p:spPr>
-        <p:style>
-          <a:lnRef idx="1">
-            <a:schemeClr val="accent6"/>
-          </a:lnRef>
-          <a:fillRef idx="2">
-            <a:schemeClr val="accent6"/>
-          </a:fillRef>
-          <a:effectRef idx="1">
-            <a:schemeClr val="accent6"/>
-          </a:effectRef>
-          <a:fontRef idx="minor">
-            <a:schemeClr val="dk1"/>
-          </a:fontRef>
-        </p:style>
-        <p:txBody>
-          <a:bodyPr rtlCol="0" anchor="ctr"/>
-          <a:lstStyle/>
-          <a:p>
-            <a:pPr algn="ctr"/>
-            <a:endParaRPr lang="en-US" dirty="0"/>
-          </a:p>
-        </p:txBody>
-      </p:sp>
       <p:grpSp>
         <p:nvGrpSpPr>
           <p:cNvPr id="54" name="Group 53"/>
@@ -4116,7 +4149,7 @@
         </p:nvSpPr>
         <p:spPr>
           <a:xfrm>
-            <a:off x="3884942" y="2012602"/>
+            <a:off x="3005184" y="2012602"/>
             <a:ext cx="811981" cy="461665"/>
           </a:xfrm>
           <a:prstGeom prst="rect">
@@ -4135,10 +4168,10 @@
                 <a:latin typeface="Times New Roman"/>
                 <a:cs typeface="Times New Roman"/>
               </a:rPr>
-              <a:t>r</a:t>
-            </a:r>
-            <a:r>
-              <a:rPr lang="en-US" sz="2400" i="1" baseline="-25000" dirty="0" err="1">
+              <a:t>d</a:t>
+            </a:r>
+            <a:r>
+              <a:rPr lang="en-US" sz="2400" i="1" baseline="-25000" dirty="0" err="1" smtClean="0">
                 <a:latin typeface="Times New Roman"/>
                 <a:cs typeface="Times New Roman"/>
               </a:rPr>
@@ -4159,8 +4192,8 @@
         </p:nvCxnSpPr>
         <p:spPr>
           <a:xfrm>
-            <a:off x="3237317" y="2095500"/>
-            <a:ext cx="1638156" cy="0"/>
+            <a:off x="1623945" y="2095500"/>
+            <a:ext cx="3251528" cy="0"/>
           </a:xfrm>
           <a:prstGeom prst="straightConnector1">
             <a:avLst/>
@@ -4197,8 +4230,8 @@
         </p:nvCxnSpPr>
         <p:spPr>
           <a:xfrm>
-            <a:off x="3417698" y="4392011"/>
-            <a:ext cx="1169567" cy="698149"/>
+            <a:off x="2295407" y="3659481"/>
+            <a:ext cx="2291858" cy="1430679"/>
           </a:xfrm>
           <a:prstGeom prst="straightConnector1">
             <a:avLst/>
@@ -4235,7 +4268,7 @@
         </p:nvSpPr>
         <p:spPr>
           <a:xfrm>
-            <a:off x="3964659" y="4176067"/>
+            <a:off x="3574544" y="4124745"/>
             <a:ext cx="811981" cy="461665"/>
           </a:xfrm>
           <a:prstGeom prst="rect">
@@ -4254,7 +4287,7 @@
                 <a:latin typeface="Times New Roman"/>
                 <a:cs typeface="Times New Roman"/>
               </a:rPr>
-              <a:t>r</a:t>
+              <a:t>d</a:t>
             </a:r>
             <a:r>
               <a:rPr lang="en-US" sz="2400" i="1" baseline="-25000" dirty="0" smtClean="0">
@@ -4358,39 +4391,6 @@
           <a:xfrm flipH="1" flipV="1">
             <a:off x="3307698" y="4725651"/>
             <a:ext cx="1570004" cy="904486"/>
-          </a:xfrm>
-          <a:prstGeom prst="line">
-            <a:avLst/>
-          </a:prstGeom>
-          <a:effectLst/>
-        </p:spPr>
-        <p:style>
-          <a:lnRef idx="2">
-            <a:schemeClr val="accent1"/>
-          </a:lnRef>
-          <a:fillRef idx="0">
-            <a:schemeClr val="accent1"/>
-          </a:fillRef>
-          <a:effectRef idx="1">
-            <a:schemeClr val="accent1"/>
-          </a:effectRef>
-          <a:fontRef idx="minor">
-            <a:schemeClr val="tx1"/>
-          </a:fontRef>
-        </p:style>
-      </p:cxnSp>
-      <p:cxnSp>
-        <p:nvCxnSpPr>
-          <p:cNvPr id="23" name="Straight Connector 22"/>
-          <p:cNvCxnSpPr>
-            <a:endCxn id="5" idx="0"/>
-          </p:cNvCxnSpPr>
-          <p:nvPr/>
-        </p:nvCxnSpPr>
-        <p:spPr>
-          <a:xfrm flipH="1">
-            <a:off x="3323087" y="4200071"/>
-            <a:ext cx="196628" cy="351264"/>
           </a:xfrm>
           <a:prstGeom prst="line">
             <a:avLst/>
@@ -4446,14 +4446,12 @@
       <p:cxnSp>
         <p:nvCxnSpPr>
           <p:cNvPr id="29" name="Straight Connector 28"/>
-          <p:cNvCxnSpPr>
-            <a:stCxn id="4" idx="2"/>
-          </p:cNvCxnSpPr>
+          <p:cNvCxnSpPr/>
           <p:nvPr/>
         </p:nvCxnSpPr>
         <p:spPr>
           <a:xfrm>
-            <a:off x="3242794" y="1783316"/>
+            <a:off x="1607886" y="1783316"/>
             <a:ext cx="0" cy="921784"/>
           </a:xfrm>
           <a:prstGeom prst="line">
@@ -5284,6 +5282,123 @@
           </a:p>
           <a:p>
             <a:endParaRPr lang="en-US" dirty="0"/>
+          </a:p>
+        </p:txBody>
+      </p:sp>
+      <p:cxnSp>
+        <p:nvCxnSpPr>
+          <p:cNvPr id="62" name="Straight Connector 61"/>
+          <p:cNvCxnSpPr/>
+          <p:nvPr/>
+        </p:nvCxnSpPr>
+        <p:spPr>
+          <a:xfrm flipH="1">
+            <a:off x="2178372" y="3506056"/>
+            <a:ext cx="205671" cy="345756"/>
+          </a:xfrm>
+          <a:prstGeom prst="line">
+            <a:avLst/>
+          </a:prstGeom>
+          <a:effectLst/>
+        </p:spPr>
+        <p:style>
+          <a:lnRef idx="2">
+            <a:schemeClr val="accent1"/>
+          </a:lnRef>
+          <a:fillRef idx="0">
+            <a:schemeClr val="accent1"/>
+          </a:fillRef>
+          <a:effectRef idx="1">
+            <a:schemeClr val="accent1"/>
+          </a:effectRef>
+          <a:fontRef idx="minor">
+            <a:schemeClr val="tx1"/>
+          </a:fontRef>
+        </p:style>
+      </p:cxnSp>
+      <p:sp>
+        <p:nvSpPr>
+          <p:cNvPr id="63" name="TextBox 62"/>
+          <p:cNvSpPr txBox="1"/>
+          <p:nvPr/>
+        </p:nvSpPr>
+        <p:spPr>
+          <a:xfrm>
+            <a:off x="8029564" y="2217854"/>
+            <a:ext cx="811981" cy="461665"/>
+          </a:xfrm>
+          <a:prstGeom prst="rect">
+            <a:avLst/>
+          </a:prstGeom>
+          <a:noFill/>
+        </p:spPr>
+        <p:txBody>
+          <a:bodyPr wrap="square" rtlCol="0">
+            <a:spAutoFit/>
+          </a:bodyPr>
+          <a:lstStyle/>
+          <a:p>
+            <a:r>
+              <a:rPr lang="en-US" sz="2400" i="1" dirty="0" err="1" smtClean="0">
+                <a:latin typeface="Times New Roman"/>
+                <a:cs typeface="Times New Roman"/>
+              </a:rPr>
+              <a:t>h</a:t>
+            </a:r>
+            <a:r>
+              <a:rPr lang="en-US" sz="2400" i="1" baseline="-25000" dirty="0" err="1" smtClean="0">
+                <a:latin typeface="Times New Roman"/>
+                <a:cs typeface="Times New Roman"/>
+              </a:rPr>
+              <a:t>top</a:t>
+            </a:r>
+            <a:endParaRPr lang="en-US" sz="2400" i="1" dirty="0">
+              <a:latin typeface="Times New Roman"/>
+              <a:cs typeface="Times New Roman"/>
+            </a:endParaRPr>
+          </a:p>
+        </p:txBody>
+      </p:sp>
+      <p:sp>
+        <p:nvSpPr>
+          <p:cNvPr id="64" name="TextBox 63"/>
+          <p:cNvSpPr txBox="1"/>
+          <p:nvPr/>
+        </p:nvSpPr>
+        <p:spPr>
+          <a:xfrm>
+            <a:off x="8029564" y="4706807"/>
+            <a:ext cx="1114436" cy="461665"/>
+          </a:xfrm>
+          <a:prstGeom prst="rect">
+            <a:avLst/>
+          </a:prstGeom>
+          <a:noFill/>
+        </p:spPr>
+        <p:txBody>
+          <a:bodyPr wrap="square" rtlCol="0">
+            <a:spAutoFit/>
+          </a:bodyPr>
+          <a:lstStyle/>
+          <a:p>
+            <a:r>
+              <a:rPr lang="en-US" sz="2400" i="1" dirty="0" err="1" smtClean="0">
+                <a:latin typeface="Times New Roman"/>
+                <a:cs typeface="Times New Roman"/>
+              </a:rPr>
+              <a:t>h</a:t>
+            </a:r>
+            <a:r>
+              <a:rPr lang="en-US" sz="2400" i="1" baseline="-25000" dirty="0" err="1" smtClean="0">
+                <a:latin typeface="Times New Roman"/>
+                <a:cs typeface="Times New Roman"/>
+              </a:rPr>
+              <a:t>bottom</a:t>
+            </a:r>
+            <a:endParaRPr lang="en-US" sz="2400" i="1" dirty="0">
+              <a:latin typeface="Times New Roman"/>
+              <a:cs typeface="Times New Roman"/>
+            </a:endParaRPr>
           </a:p>
         </p:txBody>
       </p:sp>

</xml_diff>